<commit_message>
feat: add support for multiple signature uploads and update image handling in Certificados component
</commit_message>
<xml_diff>
--- a/public/templates/certificado/verso-1a-2coluna.pptx
+++ b/public/templates/certificado/verso-1a-2coluna.pptx
@@ -3082,7 +3082,7 @@
         <p:spPr>
           <a:xfrm>
             <a:off x="6878159" y="1522070"/>
-            <a:ext cx="2507333" cy="983431"/>
+            <a:ext cx="2507333" cy="1091153"/>
           </a:xfrm>
           <a:prstGeom prst="rect">
             <a:avLst/>
@@ -3155,6 +3155,47 @@
                 <a:spcPct val="100000"/>
               </a:lnSpc>
             </a:pPr>
+            <a:endParaRPr lang="pt-BR" sz="700" b="0" u="none" strike="noStrike" dirty="0">
+              <a:solidFill>
+                <a:srgbClr val="000000"/>
+              </a:solidFill>
+              <a:uFillTx/>
+              <a:latin typeface="Arial"/>
+            </a:endParaRPr>
+          </a:p>
+          <a:p>
+            <a:pPr algn="ctr" defTabSz="914400">
+              <a:lnSpc>
+                <a:spcPct val="100000"/>
+              </a:lnSpc>
+            </a:pPr>
+            <a:endParaRPr lang="pt-BR" sz="700" dirty="0">
+              <a:solidFill>
+                <a:srgbClr val="000000"/>
+              </a:solidFill>
+              <a:latin typeface="Arial"/>
+            </a:endParaRPr>
+          </a:p>
+          <a:p>
+            <a:pPr algn="ctr" defTabSz="914400">
+              <a:lnSpc>
+                <a:spcPct val="100000"/>
+              </a:lnSpc>
+            </a:pPr>
+            <a:endParaRPr lang="pt-BR" sz="700" b="0" u="none" strike="noStrike" dirty="0">
+              <a:solidFill>
+                <a:srgbClr val="000000"/>
+              </a:solidFill>
+              <a:uFillTx/>
+              <a:latin typeface="Arial"/>
+            </a:endParaRPr>
+          </a:p>
+          <a:p>
+            <a:pPr algn="ctr" defTabSz="914400">
+              <a:lnSpc>
+                <a:spcPct val="100000"/>
+              </a:lnSpc>
+            </a:pPr>
             <a:r>
               <a:rPr lang="pt-BR" sz="700" b="0" u="none" strike="noStrike" dirty="0">
                 <a:solidFill>
@@ -3312,34 +3353,6 @@
               <a:uFillTx/>
               <a:latin typeface="Arial"/>
               <a:cs typeface="Arial"/>
-            </a:endParaRPr>
-          </a:p>
-          <a:p>
-            <a:pPr algn="ctr" defTabSz="914400">
-              <a:lnSpc>
-                <a:spcPct val="100000"/>
-              </a:lnSpc>
-            </a:pPr>
-            <a:endParaRPr lang="en-US" sz="700" b="0" u="none" strike="noStrike" dirty="0">
-              <a:solidFill>
-                <a:srgbClr val="000000"/>
-              </a:solidFill>
-              <a:uFillTx/>
-              <a:latin typeface="Arial"/>
-            </a:endParaRPr>
-          </a:p>
-          <a:p>
-            <a:pPr algn="ctr" defTabSz="914400">
-              <a:lnSpc>
-                <a:spcPct val="100000"/>
-              </a:lnSpc>
-            </a:pPr>
-            <a:endParaRPr lang="en-US" sz="700" b="0" u="none" strike="noStrike" dirty="0">
-              <a:solidFill>
-                <a:srgbClr val="000000"/>
-              </a:solidFill>
-              <a:uFillTx/>
-              <a:latin typeface="Arial"/>
             </a:endParaRPr>
           </a:p>
         </p:txBody>
@@ -3648,6 +3661,42 @@
           </a:p>
         </p:txBody>
       </p:sp>
+      <p:pic>
+        <p:nvPicPr>
+          <p:cNvPr id="4" name="Imagem 3" descr="Imagem em preto e branco&#10;&#10;O conteúdo gerado por IA pode estar incorreto.">
+            <a:extLst>
+              <a:ext uri="{FF2B5EF4-FFF2-40B4-BE49-F238E27FC236}">
+                <a16:creationId xmlns:a16="http://schemas.microsoft.com/office/drawing/2014/main" id="{87637F90-DD30-33BD-C844-2EB0E4BC3B2D}"/>
+              </a:ext>
+            </a:extLst>
+          </p:cNvPr>
+          <p:cNvPicPr>
+            <a:picLocks noChangeAspect="1"/>
+          </p:cNvPicPr>
+          <p:nvPr/>
+        </p:nvPicPr>
+        <p:blipFill>
+          <a:blip r:embed="rId2" cstate="print">
+            <a:extLst>
+              <a:ext uri="{28A0092B-C50C-407E-A947-70E740481C1C}">
+                <a14:useLocalDpi xmlns:a14="http://schemas.microsoft.com/office/drawing/2010/main" val="0"/>
+              </a:ext>
+            </a:extLst>
+          </a:blip>
+          <a:stretch>
+            <a:fillRect/>
+          </a:stretch>
+        </p:blipFill>
+        <p:spPr>
+          <a:xfrm>
+            <a:off x="7487867" y="1414835"/>
+            <a:ext cx="1287915" cy="1165563"/>
+          </a:xfrm>
+          <a:prstGeom prst="rect">
+            <a:avLst/>
+          </a:prstGeom>
+        </p:spPr>
+      </p:pic>
     </p:spTree>
   </p:cSld>
   <p:clrMapOvr>

</xml_diff>